<commit_message>
tomcat and jenkins ec2 update
</commit_message>
<xml_diff>
--- a/Week_Amazon_Web_Services/1-Continuous Integration.pptx
+++ b/Week_Amazon_Web_Services/1-Continuous Integration.pptx
@@ -209,7 +209,7 @@
           <a:p>
             <a:fld id="{E3A2EC19-D363-4750-AC96-4E77B979F061}" type="datetimeFigureOut">
               <a:rPr lang="en-US" smtClean="0"/>
-              <a:t>3/8/2016</a:t>
+              <a:t>9/26/2016</a:t>
             </a:fld>
             <a:endParaRPr lang="en-US"/>
           </a:p>
@@ -273,38 +273,37 @@
           <a:p>
             <a:pPr lvl="0"/>
             <a:r>
-              <a:rPr lang="en-US" smtClean="0"/>
+              <a:rPr lang="en-US"/>
               <a:t>Click to edit Master text styles</a:t>
             </a:r>
           </a:p>
           <a:p>
             <a:pPr lvl="1"/>
             <a:r>
-              <a:rPr lang="en-US" smtClean="0"/>
+              <a:rPr lang="en-US"/>
               <a:t>Second level</a:t>
             </a:r>
           </a:p>
           <a:p>
             <a:pPr lvl="2"/>
             <a:r>
-              <a:rPr lang="en-US" smtClean="0"/>
+              <a:rPr lang="en-US"/>
               <a:t>Third level</a:t>
             </a:r>
           </a:p>
           <a:p>
             <a:pPr lvl="3"/>
             <a:r>
-              <a:rPr lang="en-US" smtClean="0"/>
+              <a:rPr lang="en-US"/>
               <a:t>Fourth level</a:t>
             </a:r>
           </a:p>
           <a:p>
             <a:pPr lvl="4"/>
             <a:r>
-              <a:rPr lang="en-US" smtClean="0"/>
+              <a:rPr lang="en-US"/>
               <a:t>Fifth level</a:t>
             </a:r>
-            <a:endParaRPr lang="en-US"/>
           </a:p>
         </p:txBody>
       </p:sp>
@@ -522,15 +521,15 @@
           <a:lstStyle/>
           <a:p>
             <a:r>
-              <a:rPr lang="en-US" dirty="0" smtClean="0"/>
+              <a:rPr lang="en-US" dirty="0"/>
               <a:t>Source:</a:t>
             </a:r>
             <a:r>
-              <a:rPr lang="en-US" baseline="0" dirty="0" smtClean="0"/>
+              <a:rPr lang="en-US" baseline="0" dirty="0"/>
               <a:t> </a:t>
             </a:r>
             <a:r>
-              <a:rPr lang="en-US" sz="1200" kern="1200" dirty="0" smtClean="0">
+              <a:rPr lang="en-US" sz="1200" kern="1200" dirty="0">
                 <a:solidFill>
                   <a:schemeClr val="tx1"/>
                 </a:solidFill>
@@ -539,6 +538,30 @@
                 <a:cs typeface="+mn-cs"/>
               </a:rPr>
               <a:t>https://www.thoughtworks.com/continuous-integration</a:t>
+            </a:r>
+          </a:p>
+          <a:p>
+            <a:r>
+              <a:rPr lang="en-US" sz="1200" kern="1200" dirty="0">
+                <a:solidFill>
+                  <a:schemeClr val="tx1"/>
+                </a:solidFill>
+                <a:latin typeface="+mn-lt"/>
+                <a:ea typeface="+mn-ea"/>
+                <a:cs typeface="+mn-cs"/>
+              </a:rPr>
+              <a:t>SIT</a:t>
+            </a:r>
+            <a:r>
+              <a:rPr lang="en-US" sz="1200" kern="1200" baseline="0" dirty="0">
+                <a:solidFill>
+                  <a:schemeClr val="tx1"/>
+                </a:solidFill>
+                <a:latin typeface="+mn-lt"/>
+                <a:ea typeface="+mn-ea"/>
+                <a:cs typeface="+mn-cs"/>
+              </a:rPr>
+              <a:t> –Server Integration Testing</a:t>
             </a:r>
             <a:endParaRPr lang="en-US" dirty="0"/>
           </a:p>
@@ -625,11 +648,11 @@
           <a:lstStyle/>
           <a:p>
             <a:r>
-              <a:rPr lang="en-US" dirty="0" smtClean="0"/>
+              <a:rPr lang="en-US" dirty="0"/>
               <a:t>Image Source: </a:t>
             </a:r>
             <a:r>
-              <a:rPr lang="en-US" sz="1200" kern="1200" dirty="0" smtClean="0">
+              <a:rPr lang="en-US" sz="1200" kern="1200" dirty="0">
                 <a:solidFill>
                   <a:schemeClr val="tx1"/>
                 </a:solidFill>
@@ -809,7 +832,7 @@
           </a:lstStyle>
           <a:p>
             <a:r>
-              <a:rPr lang="en-US" smtClean="0"/>
+              <a:rPr lang="en-US"/>
               <a:t>Click to edit Master title style</a:t>
             </a:r>
             <a:endParaRPr lang="en-US" dirty="0"/>
@@ -881,7 +904,7 @@
           </a:lstStyle>
           <a:p>
             <a:r>
-              <a:rPr lang="en-US" smtClean="0"/>
+              <a:rPr lang="en-US"/>
               <a:t>Click to edit Master subtitle style</a:t>
             </a:r>
             <a:endParaRPr lang="en-US" dirty="0"/>
@@ -905,7 +928,7 @@
           <a:p>
             <a:fld id="{70D915A0-DC61-493F-B08B-C5A176C1077F}" type="datetimeFigureOut">
               <a:rPr lang="en-US" smtClean="0"/>
-              <a:t>3/8/2016</a:t>
+              <a:t>9/26/2016</a:t>
             </a:fld>
             <a:endParaRPr lang="en-US"/>
           </a:p>
@@ -1037,7 +1060,7 @@
           <a:lstStyle/>
           <a:p>
             <a:r>
-              <a:rPr lang="en-US" smtClean="0"/>
+              <a:rPr lang="en-US"/>
               <a:t>Click to edit Master title style</a:t>
             </a:r>
             <a:endParaRPr lang="en-US" dirty="0"/>
@@ -1061,35 +1084,35 @@
           <a:p>
             <a:pPr lvl="0"/>
             <a:r>
-              <a:rPr lang="en-US" smtClean="0"/>
+              <a:rPr lang="en-US"/>
               <a:t>Click to edit Master text styles</a:t>
             </a:r>
           </a:p>
           <a:p>
             <a:pPr lvl="1"/>
             <a:r>
-              <a:rPr lang="en-US" smtClean="0"/>
+              <a:rPr lang="en-US"/>
               <a:t>Second level</a:t>
             </a:r>
           </a:p>
           <a:p>
             <a:pPr lvl="2"/>
             <a:r>
-              <a:rPr lang="en-US" smtClean="0"/>
+              <a:rPr lang="en-US"/>
               <a:t>Third level</a:t>
             </a:r>
           </a:p>
           <a:p>
             <a:pPr lvl="3"/>
             <a:r>
-              <a:rPr lang="en-US" smtClean="0"/>
+              <a:rPr lang="en-US"/>
               <a:t>Fourth level</a:t>
             </a:r>
           </a:p>
           <a:p>
             <a:pPr lvl="4"/>
             <a:r>
-              <a:rPr lang="en-US" smtClean="0"/>
+              <a:rPr lang="en-US"/>
               <a:t>Fifth level</a:t>
             </a:r>
             <a:endParaRPr lang="en-US" dirty="0"/>
@@ -1113,7 +1136,7 @@
           <a:p>
             <a:fld id="{70D915A0-DC61-493F-B08B-C5A176C1077F}" type="datetimeFigureOut">
               <a:rPr lang="en-US" smtClean="0"/>
-              <a:t>3/8/2016</a:t>
+              <a:t>9/26/2016</a:t>
             </a:fld>
             <a:endParaRPr lang="en-US"/>
           </a:p>
@@ -1288,7 +1311,7 @@
           <a:lstStyle/>
           <a:p>
             <a:r>
-              <a:rPr lang="en-US" smtClean="0"/>
+              <a:rPr lang="en-US"/>
               <a:t>Click to edit Master title style</a:t>
             </a:r>
             <a:endParaRPr lang="en-US" dirty="0"/>
@@ -1317,35 +1340,35 @@
           <a:p>
             <a:pPr lvl="0"/>
             <a:r>
-              <a:rPr lang="en-US" smtClean="0"/>
+              <a:rPr lang="en-US"/>
               <a:t>Click to edit Master text styles</a:t>
             </a:r>
           </a:p>
           <a:p>
             <a:pPr lvl="1"/>
             <a:r>
-              <a:rPr lang="en-US" smtClean="0"/>
+              <a:rPr lang="en-US"/>
               <a:t>Second level</a:t>
             </a:r>
           </a:p>
           <a:p>
             <a:pPr lvl="2"/>
             <a:r>
-              <a:rPr lang="en-US" smtClean="0"/>
+              <a:rPr lang="en-US"/>
               <a:t>Third level</a:t>
             </a:r>
           </a:p>
           <a:p>
             <a:pPr lvl="3"/>
             <a:r>
-              <a:rPr lang="en-US" smtClean="0"/>
+              <a:rPr lang="en-US"/>
               <a:t>Fourth level</a:t>
             </a:r>
           </a:p>
           <a:p>
             <a:pPr lvl="4"/>
             <a:r>
-              <a:rPr lang="en-US" smtClean="0"/>
+              <a:rPr lang="en-US"/>
               <a:t>Fifth level</a:t>
             </a:r>
             <a:endParaRPr lang="en-US" dirty="0"/>
@@ -1369,7 +1392,7 @@
           <a:p>
             <a:fld id="{70D915A0-DC61-493F-B08B-C5A176C1077F}" type="datetimeFigureOut">
               <a:rPr lang="en-US" smtClean="0"/>
-              <a:t>3/8/2016</a:t>
+              <a:t>9/26/2016</a:t>
             </a:fld>
             <a:endParaRPr lang="en-US"/>
           </a:p>
@@ -1463,7 +1486,7 @@
           <a:lstStyle/>
           <a:p>
             <a:r>
-              <a:rPr lang="en-US" smtClean="0"/>
+              <a:rPr lang="en-US"/>
               <a:t>Click to edit Master title style</a:t>
             </a:r>
             <a:endParaRPr lang="en-US" dirty="0"/>
@@ -1487,35 +1510,35 @@
           <a:p>
             <a:pPr lvl="0"/>
             <a:r>
-              <a:rPr lang="en-US" smtClean="0"/>
+              <a:rPr lang="en-US"/>
               <a:t>Click to edit Master text styles</a:t>
             </a:r>
           </a:p>
           <a:p>
             <a:pPr lvl="1"/>
             <a:r>
-              <a:rPr lang="en-US" smtClean="0"/>
+              <a:rPr lang="en-US"/>
               <a:t>Second level</a:t>
             </a:r>
           </a:p>
           <a:p>
             <a:pPr lvl="2"/>
             <a:r>
-              <a:rPr lang="en-US" smtClean="0"/>
+              <a:rPr lang="en-US"/>
               <a:t>Third level</a:t>
             </a:r>
           </a:p>
           <a:p>
             <a:pPr lvl="3"/>
             <a:r>
-              <a:rPr lang="en-US" smtClean="0"/>
+              <a:rPr lang="en-US"/>
               <a:t>Fourth level</a:t>
             </a:r>
           </a:p>
           <a:p>
             <a:pPr lvl="4"/>
             <a:r>
-              <a:rPr lang="en-US" smtClean="0"/>
+              <a:rPr lang="en-US"/>
               <a:t>Fifth level</a:t>
             </a:r>
             <a:endParaRPr lang="en-US" dirty="0"/>
@@ -1539,7 +1562,7 @@
           <a:p>
             <a:fld id="{70D915A0-DC61-493F-B08B-C5A176C1077F}" type="datetimeFigureOut">
               <a:rPr lang="en-US" smtClean="0"/>
-              <a:t>3/8/2016</a:t>
+              <a:t>9/26/2016</a:t>
             </a:fld>
             <a:endParaRPr lang="en-US"/>
           </a:p>
@@ -1738,7 +1761,7 @@
           </a:lstStyle>
           <a:p>
             <a:r>
-              <a:rPr lang="en-US" smtClean="0"/>
+              <a:rPr lang="en-US"/>
               <a:t>Click to edit Master title style</a:t>
             </a:r>
             <a:endParaRPr lang="en-US" dirty="0"/>
@@ -1859,7 +1882,7 @@
           <a:p>
             <a:pPr lvl="0"/>
             <a:r>
-              <a:rPr lang="en-US" smtClean="0"/>
+              <a:rPr lang="en-US"/>
               <a:t>Click to edit Master text styles</a:t>
             </a:r>
           </a:p>
@@ -1882,7 +1905,7 @@
           <a:p>
             <a:fld id="{70D915A0-DC61-493F-B08B-C5A176C1077F}" type="datetimeFigureOut">
               <a:rPr lang="en-US" smtClean="0"/>
-              <a:t>3/8/2016</a:t>
+              <a:t>9/26/2016</a:t>
             </a:fld>
             <a:endParaRPr lang="en-US"/>
           </a:p>
@@ -2019,7 +2042,7 @@
           <a:lstStyle/>
           <a:p>
             <a:r>
-              <a:rPr lang="en-US" smtClean="0"/>
+              <a:rPr lang="en-US"/>
               <a:t>Click to edit Master title style</a:t>
             </a:r>
             <a:endParaRPr lang="en-US" dirty="0"/>
@@ -2048,35 +2071,35 @@
           <a:p>
             <a:pPr lvl="0"/>
             <a:r>
-              <a:rPr lang="en-US" smtClean="0"/>
+              <a:rPr lang="en-US"/>
               <a:t>Click to edit Master text styles</a:t>
             </a:r>
           </a:p>
           <a:p>
             <a:pPr lvl="1"/>
             <a:r>
-              <a:rPr lang="en-US" smtClean="0"/>
+              <a:rPr lang="en-US"/>
               <a:t>Second level</a:t>
             </a:r>
           </a:p>
           <a:p>
             <a:pPr lvl="2"/>
             <a:r>
-              <a:rPr lang="en-US" smtClean="0"/>
+              <a:rPr lang="en-US"/>
               <a:t>Third level</a:t>
             </a:r>
           </a:p>
           <a:p>
             <a:pPr lvl="3"/>
             <a:r>
-              <a:rPr lang="en-US" smtClean="0"/>
+              <a:rPr lang="en-US"/>
               <a:t>Fourth level</a:t>
             </a:r>
           </a:p>
           <a:p>
             <a:pPr lvl="4"/>
             <a:r>
-              <a:rPr lang="en-US" smtClean="0"/>
+              <a:rPr lang="en-US"/>
               <a:t>Fifth level</a:t>
             </a:r>
             <a:endParaRPr lang="en-US" dirty="0"/>
@@ -2105,35 +2128,35 @@
           <a:p>
             <a:pPr lvl="0"/>
             <a:r>
-              <a:rPr lang="en-US" smtClean="0"/>
+              <a:rPr lang="en-US"/>
               <a:t>Click to edit Master text styles</a:t>
             </a:r>
           </a:p>
           <a:p>
             <a:pPr lvl="1"/>
             <a:r>
-              <a:rPr lang="en-US" smtClean="0"/>
+              <a:rPr lang="en-US"/>
               <a:t>Second level</a:t>
             </a:r>
           </a:p>
           <a:p>
             <a:pPr lvl="2"/>
             <a:r>
-              <a:rPr lang="en-US" smtClean="0"/>
+              <a:rPr lang="en-US"/>
               <a:t>Third level</a:t>
             </a:r>
           </a:p>
           <a:p>
             <a:pPr lvl="3"/>
             <a:r>
-              <a:rPr lang="en-US" smtClean="0"/>
+              <a:rPr lang="en-US"/>
               <a:t>Fourth level</a:t>
             </a:r>
           </a:p>
           <a:p>
             <a:pPr lvl="4"/>
             <a:r>
-              <a:rPr lang="en-US" smtClean="0"/>
+              <a:rPr lang="en-US"/>
               <a:t>Fifth level</a:t>
             </a:r>
             <a:endParaRPr lang="en-US" dirty="0"/>
@@ -2157,7 +2180,7 @@
           <a:p>
             <a:fld id="{70D915A0-DC61-493F-B08B-C5A176C1077F}" type="datetimeFigureOut">
               <a:rPr lang="en-US" smtClean="0"/>
-              <a:t>3/8/2016</a:t>
+              <a:t>9/26/2016</a:t>
             </a:fld>
             <a:endParaRPr lang="en-US"/>
           </a:p>
@@ -2256,7 +2279,7 @@
           <a:lstStyle/>
           <a:p>
             <a:r>
-              <a:rPr lang="en-US" smtClean="0"/>
+              <a:rPr lang="en-US"/>
               <a:t>Click to edit Master title style</a:t>
             </a:r>
             <a:endParaRPr lang="en-US" dirty="0"/>
@@ -2328,7 +2351,7 @@
           <a:p>
             <a:pPr lvl="0"/>
             <a:r>
-              <a:rPr lang="en-US" smtClean="0"/>
+              <a:rPr lang="en-US"/>
               <a:t>Click to edit Master text styles</a:t>
             </a:r>
           </a:p>
@@ -2356,35 +2379,35 @@
           <a:p>
             <a:pPr lvl="0"/>
             <a:r>
-              <a:rPr lang="en-US" smtClean="0"/>
+              <a:rPr lang="en-US"/>
               <a:t>Click to edit Master text styles</a:t>
             </a:r>
           </a:p>
           <a:p>
             <a:pPr lvl="1"/>
             <a:r>
-              <a:rPr lang="en-US" smtClean="0"/>
+              <a:rPr lang="en-US"/>
               <a:t>Second level</a:t>
             </a:r>
           </a:p>
           <a:p>
             <a:pPr lvl="2"/>
             <a:r>
-              <a:rPr lang="en-US" smtClean="0"/>
+              <a:rPr lang="en-US"/>
               <a:t>Third level</a:t>
             </a:r>
           </a:p>
           <a:p>
             <a:pPr lvl="3"/>
             <a:r>
-              <a:rPr lang="en-US" smtClean="0"/>
+              <a:rPr lang="en-US"/>
               <a:t>Fourth level</a:t>
             </a:r>
           </a:p>
           <a:p>
             <a:pPr lvl="4"/>
             <a:r>
-              <a:rPr lang="en-US" smtClean="0"/>
+              <a:rPr lang="en-US"/>
               <a:t>Fifth level</a:t>
             </a:r>
             <a:endParaRPr lang="en-US" dirty="0"/>
@@ -2456,7 +2479,7 @@
           <a:p>
             <a:pPr lvl="0"/>
             <a:r>
-              <a:rPr lang="en-US" smtClean="0"/>
+              <a:rPr lang="en-US"/>
               <a:t>Click to edit Master text styles</a:t>
             </a:r>
           </a:p>
@@ -2484,35 +2507,35 @@
           <a:p>
             <a:pPr lvl="0"/>
             <a:r>
-              <a:rPr lang="en-US" smtClean="0"/>
+              <a:rPr lang="en-US"/>
               <a:t>Click to edit Master text styles</a:t>
             </a:r>
           </a:p>
           <a:p>
             <a:pPr lvl="1"/>
             <a:r>
-              <a:rPr lang="en-US" smtClean="0"/>
+              <a:rPr lang="en-US"/>
               <a:t>Second level</a:t>
             </a:r>
           </a:p>
           <a:p>
             <a:pPr lvl="2"/>
             <a:r>
-              <a:rPr lang="en-US" smtClean="0"/>
+              <a:rPr lang="en-US"/>
               <a:t>Third level</a:t>
             </a:r>
           </a:p>
           <a:p>
             <a:pPr lvl="3"/>
             <a:r>
-              <a:rPr lang="en-US" smtClean="0"/>
+              <a:rPr lang="en-US"/>
               <a:t>Fourth level</a:t>
             </a:r>
           </a:p>
           <a:p>
             <a:pPr lvl="4"/>
             <a:r>
-              <a:rPr lang="en-US" smtClean="0"/>
+              <a:rPr lang="en-US"/>
               <a:t>Fifth level</a:t>
             </a:r>
             <a:endParaRPr lang="en-US" dirty="0"/>
@@ -2536,7 +2559,7 @@
           <a:p>
             <a:fld id="{70D915A0-DC61-493F-B08B-C5A176C1077F}" type="datetimeFigureOut">
               <a:rPr lang="en-US" smtClean="0"/>
-              <a:t>3/8/2016</a:t>
+              <a:t>9/26/2016</a:t>
             </a:fld>
             <a:endParaRPr lang="en-US"/>
           </a:p>
@@ -2630,7 +2653,7 @@
           <a:lstStyle/>
           <a:p>
             <a:r>
-              <a:rPr lang="en-US" smtClean="0"/>
+              <a:rPr lang="en-US"/>
               <a:t>Click to edit Master title style</a:t>
             </a:r>
             <a:endParaRPr lang="en-US" dirty="0"/>
@@ -2654,7 +2677,7 @@
           <a:p>
             <a:fld id="{70D915A0-DC61-493F-B08B-C5A176C1077F}" type="datetimeFigureOut">
               <a:rPr lang="en-US" smtClean="0"/>
-              <a:t>3/8/2016</a:t>
+              <a:t>9/26/2016</a:t>
             </a:fld>
             <a:endParaRPr lang="en-US"/>
           </a:p>
@@ -2825,7 +2848,7 @@
           <a:p>
             <a:fld id="{70D915A0-DC61-493F-B08B-C5A176C1077F}" type="datetimeFigureOut">
               <a:rPr lang="en-US" smtClean="0"/>
-              <a:t>3/8/2016</a:t>
+              <a:t>9/26/2016</a:t>
             </a:fld>
             <a:endParaRPr lang="en-US"/>
           </a:p>
@@ -3018,7 +3041,7 @@
           </a:lstStyle>
           <a:p>
             <a:r>
-              <a:rPr lang="en-US" smtClean="0"/>
+              <a:rPr lang="en-US"/>
               <a:t>Click to edit Master title style</a:t>
             </a:r>
             <a:endParaRPr lang="en-US" dirty="0"/>
@@ -3047,35 +3070,35 @@
           <a:p>
             <a:pPr lvl="0"/>
             <a:r>
-              <a:rPr lang="en-US" smtClean="0"/>
+              <a:rPr lang="en-US"/>
               <a:t>Click to edit Master text styles</a:t>
             </a:r>
           </a:p>
           <a:p>
             <a:pPr lvl="1"/>
             <a:r>
-              <a:rPr lang="en-US" smtClean="0"/>
+              <a:rPr lang="en-US"/>
               <a:t>Second level</a:t>
             </a:r>
           </a:p>
           <a:p>
             <a:pPr lvl="2"/>
             <a:r>
-              <a:rPr lang="en-US" smtClean="0"/>
+              <a:rPr lang="en-US"/>
               <a:t>Third level</a:t>
             </a:r>
           </a:p>
           <a:p>
             <a:pPr lvl="3"/>
             <a:r>
-              <a:rPr lang="en-US" smtClean="0"/>
+              <a:rPr lang="en-US"/>
               <a:t>Fourth level</a:t>
             </a:r>
           </a:p>
           <a:p>
             <a:pPr lvl="4"/>
             <a:r>
-              <a:rPr lang="en-US" smtClean="0"/>
+              <a:rPr lang="en-US"/>
               <a:t>Fifth level</a:t>
             </a:r>
             <a:endParaRPr lang="en-US" dirty="0"/>
@@ -3147,7 +3170,7 @@
           <a:p>
             <a:pPr lvl="0"/>
             <a:r>
-              <a:rPr lang="en-US" smtClean="0"/>
+              <a:rPr lang="en-US"/>
               <a:t>Click to edit Master text styles</a:t>
             </a:r>
           </a:p>
@@ -3179,7 +3202,7 @@
           <a:p>
             <a:fld id="{70D915A0-DC61-493F-B08B-C5A176C1077F}" type="datetimeFigureOut">
               <a:rPr lang="en-US" smtClean="0"/>
-              <a:t>3/8/2016</a:t>
+              <a:t>9/26/2016</a:t>
             </a:fld>
             <a:endParaRPr lang="en-US"/>
           </a:p>
@@ -3385,7 +3408,7 @@
           </a:lstStyle>
           <a:p>
             <a:r>
-              <a:rPr lang="en-US" smtClean="0"/>
+              <a:rPr lang="en-US"/>
               <a:t>Click to edit Master title style</a:t>
             </a:r>
             <a:endParaRPr lang="en-US" dirty="0"/>
@@ -3455,7 +3478,7 @@
           </a:lstStyle>
           <a:p>
             <a:r>
-              <a:rPr lang="en-US" smtClean="0"/>
+              <a:rPr lang="en-US"/>
               <a:t>Click icon to add picture</a:t>
             </a:r>
             <a:endParaRPr lang="en-US" dirty="0"/>
@@ -3533,7 +3556,7 @@
           <a:p>
             <a:pPr lvl="0"/>
             <a:r>
-              <a:rPr lang="en-US" smtClean="0"/>
+              <a:rPr lang="en-US"/>
               <a:t>Click to edit Master text styles</a:t>
             </a:r>
           </a:p>
@@ -3556,7 +3579,7 @@
           <a:p>
             <a:fld id="{70D915A0-DC61-493F-B08B-C5A176C1077F}" type="datetimeFigureOut">
               <a:rPr lang="en-US" smtClean="0"/>
-              <a:t>3/8/2016</a:t>
+              <a:t>9/26/2016</a:t>
             </a:fld>
             <a:endParaRPr lang="en-US"/>
           </a:p>
@@ -3741,7 +3764,7 @@
           <a:lstStyle/>
           <a:p>
             <a:r>
-              <a:rPr lang="en-US" smtClean="0"/>
+              <a:rPr lang="en-US"/>
               <a:t>Click to edit Master title style</a:t>
             </a:r>
             <a:endParaRPr lang="en-US" dirty="0"/>
@@ -3775,35 +3798,35 @@
           <a:p>
             <a:pPr lvl="0"/>
             <a:r>
-              <a:rPr lang="en-US" smtClean="0"/>
+              <a:rPr lang="en-US"/>
               <a:t>Click to edit Master text styles</a:t>
             </a:r>
           </a:p>
           <a:p>
             <a:pPr lvl="1"/>
             <a:r>
-              <a:rPr lang="en-US" smtClean="0"/>
+              <a:rPr lang="en-US"/>
               <a:t>Second level</a:t>
             </a:r>
           </a:p>
           <a:p>
             <a:pPr lvl="2"/>
             <a:r>
-              <a:rPr lang="en-US" smtClean="0"/>
+              <a:rPr lang="en-US"/>
               <a:t>Third level</a:t>
             </a:r>
           </a:p>
           <a:p>
             <a:pPr lvl="3"/>
             <a:r>
-              <a:rPr lang="en-US" smtClean="0"/>
+              <a:rPr lang="en-US"/>
               <a:t>Fourth level</a:t>
             </a:r>
           </a:p>
           <a:p>
             <a:pPr lvl="4"/>
             <a:r>
-              <a:rPr lang="en-US" smtClean="0"/>
+              <a:rPr lang="en-US"/>
               <a:t>Fifth level</a:t>
             </a:r>
             <a:endParaRPr lang="en-US" dirty="0"/>
@@ -3843,7 +3866,7 @@
           <a:p>
             <a:fld id="{70D915A0-DC61-493F-B08B-C5A176C1077F}" type="datetimeFigureOut">
               <a:rPr lang="en-US" smtClean="0"/>
-              <a:t>3/8/2016</a:t>
+              <a:t>9/26/2016</a:t>
             </a:fld>
             <a:endParaRPr lang="en-US"/>
           </a:p>
@@ -4399,13 +4422,6 @@
   <p:clrMapOvr>
     <a:masterClrMapping/>
   </p:clrMapOvr>
-  <p:timing>
-    <p:tnLst>
-      <p:par>
-        <p:cTn id="1" dur="indefinite" restart="never" nodeType="tmRoot"/>
-      </p:par>
-    </p:tnLst>
-  </p:timing>
 </p:sld>
 </file>
 
@@ -4442,10 +4458,9 @@
           <a:lstStyle/>
           <a:p>
             <a:r>
-              <a:rPr lang="en-US" dirty="0" smtClean="0"/>
+              <a:rPr lang="en-US" dirty="0"/>
               <a:t>Hudson GUI</a:t>
             </a:r>
-            <a:endParaRPr lang="en-US" dirty="0"/>
           </a:p>
         </p:txBody>
       </p:sp>
@@ -4489,13 +4504,6 @@
   <p:clrMapOvr>
     <a:masterClrMapping/>
   </p:clrMapOvr>
-  <p:timing>
-    <p:tnLst>
-      <p:par>
-        <p:cTn id="1" dur="indefinite" restart="never" nodeType="tmRoot"/>
-      </p:par>
-    </p:tnLst>
-  </p:timing>
 </p:sld>
 </file>
 
@@ -4532,10 +4540,9 @@
           <a:lstStyle/>
           <a:p>
             <a:r>
-              <a:rPr lang="en-US" dirty="0" smtClean="0"/>
+              <a:rPr lang="en-US" dirty="0"/>
               <a:t>Jenkins GUI</a:t>
             </a:r>
-            <a:endParaRPr lang="en-US" dirty="0"/>
           </a:p>
         </p:txBody>
       </p:sp>
@@ -4579,13 +4586,6 @@
   <p:clrMapOvr>
     <a:masterClrMapping/>
   </p:clrMapOvr>
-  <p:timing>
-    <p:tnLst>
-      <p:par>
-        <p:cTn id="1" dur="indefinite" restart="never" nodeType="tmRoot"/>
-      </p:par>
-    </p:tnLst>
-  </p:timing>
 </p:sld>
 </file>
 
@@ -4622,10 +4622,9 @@
           <a:lstStyle/>
           <a:p>
             <a:r>
-              <a:rPr lang="en-US" dirty="0" smtClean="0"/>
+              <a:rPr lang="en-US" dirty="0"/>
               <a:t>Top 2 CI Tools</a:t>
             </a:r>
-            <a:endParaRPr lang="en-US" dirty="0"/>
           </a:p>
         </p:txBody>
       </p:sp>
@@ -4649,7 +4648,7 @@
               <a:buChar char="Ø"/>
             </a:pPr>
             <a:r>
-              <a:rPr lang="en-US" dirty="0" smtClean="0"/>
+              <a:rPr lang="en-US" dirty="0"/>
               <a:t>Maintained by Oracle</a:t>
             </a:r>
           </a:p>
@@ -4659,7 +4658,7 @@
               <a:buChar char="Ø"/>
             </a:pPr>
             <a:r>
-              <a:rPr lang="en-US" dirty="0" smtClean="0"/>
+              <a:rPr lang="en-US" dirty="0"/>
               <a:t>136 commits from 4 contributors</a:t>
             </a:r>
           </a:p>
@@ -4669,7 +4668,7 @@
               <a:buChar char="Ø"/>
             </a:pPr>
             <a:r>
-              <a:rPr lang="en-US" dirty="0" smtClean="0"/>
+              <a:rPr lang="en-US" dirty="0"/>
               <a:t>264 issues since 2011</a:t>
             </a:r>
           </a:p>
@@ -4702,7 +4701,7 @@
               <a:buChar char="Ø"/>
             </a:pPr>
             <a:r>
-              <a:rPr lang="en-US" dirty="0" smtClean="0"/>
+              <a:rPr lang="en-US" dirty="0"/>
               <a:t>Community developers (including OGs)</a:t>
             </a:r>
           </a:p>
@@ -4712,7 +4711,7 @@
               <a:buChar char="Ø"/>
             </a:pPr>
             <a:r>
-              <a:rPr lang="en-US" dirty="0" smtClean="0"/>
+              <a:rPr lang="en-US" dirty="0"/>
               <a:t>307 commits from 30 contributors</a:t>
             </a:r>
           </a:p>
@@ -4722,7 +4721,7 @@
               <a:buChar char="Ø"/>
             </a:pPr>
             <a:r>
-              <a:rPr lang="en-US" dirty="0" smtClean="0"/>
+              <a:rPr lang="en-US" dirty="0"/>
               <a:t>79 issues since 2001</a:t>
             </a:r>
           </a:p>
@@ -4732,10 +4731,9 @@
               <a:buChar char="Ø"/>
             </a:pPr>
             <a:r>
-              <a:rPr lang="en-US" dirty="0" smtClean="0"/>
+              <a:rPr lang="en-US" dirty="0"/>
               <a:t>More widely adopted</a:t>
             </a:r>
-            <a:endParaRPr lang="en-US" dirty="0"/>
           </a:p>
         </p:txBody>
       </p:sp>
@@ -4873,7 +4871,7 @@
           <a:p>
             <a:pPr algn="ctr"/>
             <a:r>
-              <a:rPr lang="en-US" dirty="0" smtClean="0">
+              <a:rPr lang="en-US" dirty="0">
                 <a:solidFill>
                   <a:schemeClr val="tx1"/>
                 </a:solidFill>
@@ -4881,12 +4879,6 @@
               </a:rPr>
               <a:t>BEAST MODE!</a:t>
             </a:r>
-            <a:endParaRPr lang="en-US" dirty="0">
-              <a:solidFill>
-                <a:schemeClr val="tx1"/>
-              </a:solidFill>
-              <a:latin typeface="Goudy Stout" panose="0202090407030B020401" pitchFamily="18" charset="0"/>
-            </a:endParaRPr>
           </a:p>
         </p:txBody>
       </p:sp>
@@ -5410,10 +5402,9 @@
           <a:lstStyle/>
           <a:p>
             <a:r>
-              <a:rPr lang="en-US" dirty="0" smtClean="0"/>
+              <a:rPr lang="en-US" dirty="0"/>
               <a:t>Review</a:t>
             </a:r>
-            <a:endParaRPr lang="en-US" dirty="0"/>
           </a:p>
         </p:txBody>
       </p:sp>
@@ -5439,7 +5430,7 @@
               <a:buAutoNum type="arabicParenR"/>
             </a:pPr>
             <a:r>
-              <a:rPr lang="en-US" dirty="0" smtClean="0"/>
+              <a:rPr lang="en-US" dirty="0"/>
               <a:t>Continuous Integration</a:t>
             </a:r>
           </a:p>
@@ -5449,7 +5440,7 @@
               <a:buAutoNum type="arabicParenR"/>
             </a:pPr>
             <a:r>
-              <a:rPr lang="en-US" dirty="0" smtClean="0"/>
+              <a:rPr lang="en-US" dirty="0"/>
               <a:t>CI Practices</a:t>
             </a:r>
           </a:p>
@@ -5459,7 +5450,7 @@
               <a:buAutoNum type="arabicParenR"/>
             </a:pPr>
             <a:r>
-              <a:rPr lang="en-US" dirty="0" smtClean="0"/>
+              <a:rPr lang="en-US" dirty="0"/>
               <a:t>How to Implement CI Practices</a:t>
             </a:r>
           </a:p>
@@ -5469,7 +5460,7 @@
               <a:buAutoNum type="arabicParenR"/>
             </a:pPr>
             <a:r>
-              <a:rPr lang="en-US" dirty="0" smtClean="0"/>
+              <a:rPr lang="en-US" dirty="0"/>
               <a:t>Team Responsibilities</a:t>
             </a:r>
           </a:p>
@@ -5479,7 +5470,7 @@
               <a:buAutoNum type="arabicParenR"/>
             </a:pPr>
             <a:r>
-              <a:rPr lang="en-US" dirty="0" smtClean="0"/>
+              <a:rPr lang="en-US" dirty="0"/>
               <a:t>Continuous Integration Workflow</a:t>
             </a:r>
           </a:p>
@@ -5489,7 +5480,7 @@
               <a:buAutoNum type="arabicParenR"/>
             </a:pPr>
             <a:r>
-              <a:rPr lang="en-US" dirty="0" smtClean="0"/>
+              <a:rPr lang="en-US" dirty="0"/>
               <a:t>Hudson</a:t>
             </a:r>
           </a:p>
@@ -5499,7 +5490,7 @@
               <a:buAutoNum type="arabicParenR"/>
             </a:pPr>
             <a:r>
-              <a:rPr lang="en-US" dirty="0" smtClean="0"/>
+              <a:rPr lang="en-US" dirty="0"/>
               <a:t>Jenkins</a:t>
             </a:r>
           </a:p>
@@ -5509,7 +5500,7 @@
               <a:buAutoNum type="arabicParenR"/>
             </a:pPr>
             <a:r>
-              <a:rPr lang="en-US" dirty="0" smtClean="0"/>
+              <a:rPr lang="en-US" dirty="0"/>
               <a:t>Top 2 CI Tools</a:t>
             </a:r>
           </a:p>
@@ -5518,35 +5509,35 @@
               <a:buFont typeface="+mj-lt"/>
               <a:buAutoNum type="arabicParenR"/>
             </a:pPr>
-            <a:endParaRPr lang="en-US" dirty="0" smtClean="0"/>
+            <a:endParaRPr lang="en-US" dirty="0"/>
           </a:p>
           <a:p>
             <a:pPr marL="514350" indent="-514350">
               <a:buFont typeface="+mj-lt"/>
               <a:buAutoNum type="arabicParenR"/>
             </a:pPr>
-            <a:endParaRPr lang="en-US" dirty="0" smtClean="0"/>
+            <a:endParaRPr lang="en-US" dirty="0"/>
           </a:p>
           <a:p>
             <a:pPr marL="514350" indent="-514350">
               <a:buFont typeface="+mj-lt"/>
               <a:buAutoNum type="arabicParenR"/>
             </a:pPr>
-            <a:endParaRPr lang="en-US" dirty="0" smtClean="0"/>
+            <a:endParaRPr lang="en-US" dirty="0"/>
           </a:p>
           <a:p>
             <a:pPr marL="514350" indent="-514350">
               <a:buFont typeface="+mj-lt"/>
               <a:buAutoNum type="arabicParenR"/>
             </a:pPr>
-            <a:endParaRPr lang="en-US" dirty="0" smtClean="0"/>
+            <a:endParaRPr lang="en-US" dirty="0"/>
           </a:p>
           <a:p>
             <a:pPr marL="514350" indent="-514350">
               <a:buFont typeface="+mj-lt"/>
               <a:buAutoNum type="arabicParenR"/>
             </a:pPr>
-            <a:endParaRPr lang="en-US" dirty="0" smtClean="0"/>
+            <a:endParaRPr lang="en-US" dirty="0"/>
           </a:p>
           <a:p>
             <a:pPr marL="514350" indent="-514350">
@@ -5567,13 +5558,6 @@
   <p:clrMapOvr>
     <a:masterClrMapping/>
   </p:clrMapOvr>
-  <p:timing>
-    <p:tnLst>
-      <p:par>
-        <p:cTn id="1" dur="indefinite" restart="never" nodeType="tmRoot"/>
-      </p:par>
-    </p:tnLst>
-  </p:timing>
 </p:sld>
 </file>
 
@@ -5610,10 +5594,9 @@
           <a:lstStyle/>
           <a:p>
             <a:r>
-              <a:rPr lang="en-US" dirty="0" smtClean="0"/>
+              <a:rPr lang="en-US" dirty="0"/>
               <a:t>Topics</a:t>
             </a:r>
-            <a:endParaRPr lang="en-US" dirty="0"/>
           </a:p>
         </p:txBody>
       </p:sp>
@@ -5639,7 +5622,7 @@
               <a:buAutoNum type="arabicParenR"/>
             </a:pPr>
             <a:r>
-              <a:rPr lang="en-US" dirty="0" smtClean="0"/>
+              <a:rPr lang="en-US" dirty="0"/>
               <a:t>Continuous Integration</a:t>
             </a:r>
           </a:p>
@@ -5649,7 +5632,7 @@
               <a:buAutoNum type="arabicParenR"/>
             </a:pPr>
             <a:r>
-              <a:rPr lang="en-US" dirty="0" smtClean="0"/>
+              <a:rPr lang="en-US" dirty="0"/>
               <a:t>CI Practices</a:t>
             </a:r>
           </a:p>
@@ -5659,7 +5642,7 @@
               <a:buAutoNum type="arabicParenR"/>
             </a:pPr>
             <a:r>
-              <a:rPr lang="en-US" dirty="0" smtClean="0"/>
+              <a:rPr lang="en-US" dirty="0"/>
               <a:t>How to Implement CI Practices</a:t>
             </a:r>
           </a:p>
@@ -5669,7 +5652,7 @@
               <a:buAutoNum type="arabicParenR"/>
             </a:pPr>
             <a:r>
-              <a:rPr lang="en-US" dirty="0" smtClean="0"/>
+              <a:rPr lang="en-US" dirty="0"/>
               <a:t>Team Responsibilities</a:t>
             </a:r>
           </a:p>
@@ -5679,7 +5662,7 @@
               <a:buAutoNum type="arabicParenR"/>
             </a:pPr>
             <a:r>
-              <a:rPr lang="en-US" dirty="0" smtClean="0"/>
+              <a:rPr lang="en-US" dirty="0"/>
               <a:t>Continuous Integration Workflow</a:t>
             </a:r>
           </a:p>
@@ -5689,7 +5672,7 @@
               <a:buAutoNum type="arabicParenR"/>
             </a:pPr>
             <a:r>
-              <a:rPr lang="en-US" dirty="0" smtClean="0"/>
+              <a:rPr lang="en-US" dirty="0"/>
               <a:t>Hudson</a:t>
             </a:r>
           </a:p>
@@ -5699,7 +5682,7 @@
               <a:buAutoNum type="arabicParenR"/>
             </a:pPr>
             <a:r>
-              <a:rPr lang="en-US" dirty="0" smtClean="0"/>
+              <a:rPr lang="en-US" dirty="0"/>
               <a:t>Jenkins</a:t>
             </a:r>
           </a:p>
@@ -5709,7 +5692,7 @@
               <a:buAutoNum type="arabicParenR"/>
             </a:pPr>
             <a:r>
-              <a:rPr lang="en-US" dirty="0" smtClean="0"/>
+              <a:rPr lang="en-US" dirty="0"/>
               <a:t>Top 2 CI Tools</a:t>
             </a:r>
           </a:p>
@@ -5718,35 +5701,35 @@
               <a:buFont typeface="+mj-lt"/>
               <a:buAutoNum type="arabicParenR"/>
             </a:pPr>
-            <a:endParaRPr lang="en-US" dirty="0" smtClean="0"/>
+            <a:endParaRPr lang="en-US" dirty="0"/>
           </a:p>
           <a:p>
             <a:pPr marL="514350" indent="-514350">
               <a:buFont typeface="+mj-lt"/>
               <a:buAutoNum type="arabicParenR"/>
             </a:pPr>
-            <a:endParaRPr lang="en-US" dirty="0" smtClean="0"/>
+            <a:endParaRPr lang="en-US" dirty="0"/>
           </a:p>
           <a:p>
             <a:pPr marL="514350" indent="-514350">
               <a:buFont typeface="+mj-lt"/>
               <a:buAutoNum type="arabicParenR"/>
             </a:pPr>
-            <a:endParaRPr lang="en-US" dirty="0" smtClean="0"/>
+            <a:endParaRPr lang="en-US" dirty="0"/>
           </a:p>
           <a:p>
             <a:pPr marL="514350" indent="-514350">
               <a:buFont typeface="+mj-lt"/>
               <a:buAutoNum type="arabicParenR"/>
             </a:pPr>
-            <a:endParaRPr lang="en-US" dirty="0" smtClean="0"/>
+            <a:endParaRPr lang="en-US" dirty="0"/>
           </a:p>
           <a:p>
             <a:pPr marL="514350" indent="-514350">
               <a:buFont typeface="+mj-lt"/>
               <a:buAutoNum type="arabicParenR"/>
             </a:pPr>
-            <a:endParaRPr lang="en-US" dirty="0" smtClean="0"/>
+            <a:endParaRPr lang="en-US" dirty="0"/>
           </a:p>
           <a:p>
             <a:pPr marL="514350" indent="-514350">
@@ -5767,13 +5750,6 @@
   <p:clrMapOvr>
     <a:masterClrMapping/>
   </p:clrMapOvr>
-  <p:timing>
-    <p:tnLst>
-      <p:par>
-        <p:cTn id="1" dur="indefinite" restart="never" nodeType="tmRoot"/>
-      </p:par>
-    </p:tnLst>
-  </p:timing>
 </p:sld>
 </file>
 
@@ -5810,10 +5786,9 @@
           <a:lstStyle/>
           <a:p>
             <a:r>
-              <a:rPr lang="en-US" dirty="0" smtClean="0"/>
+              <a:rPr lang="en-US" dirty="0"/>
               <a:t>Continuous Integration (CI)</a:t>
             </a:r>
-            <a:endParaRPr lang="en-US" dirty="0"/>
           </a:p>
         </p:txBody>
       </p:sp>
@@ -5837,16 +5812,8 @@
               <a:buChar char="Ø"/>
             </a:pPr>
             <a:r>
-              <a:rPr lang="en-US" dirty="0" smtClean="0"/>
-              <a:t>A development </a:t>
-            </a:r>
-            <a:r>
               <a:rPr lang="en-US" dirty="0"/>
-              <a:t>practice that requires developers to integrate code into a </a:t>
-            </a:r>
-            <a:r>
-              <a:rPr lang="en-US" dirty="0" smtClean="0"/>
-              <a:t>SCM repository regularly</a:t>
+              <a:t>A development practice that requires developers to integrate code into a SCM repository regularly</a:t>
             </a:r>
           </a:p>
           <a:p>
@@ -5855,7 +5822,7 @@
               <a:buChar char="Ø"/>
             </a:pPr>
             <a:r>
-              <a:rPr lang="en-US" dirty="0" smtClean="0"/>
+              <a:rPr lang="en-US" dirty="0"/>
               <a:t>Teams perform daily builds</a:t>
             </a:r>
           </a:p>
@@ -5865,16 +5832,8 @@
               <a:buChar char="Ø"/>
             </a:pPr>
             <a:r>
-              <a:rPr lang="en-US" dirty="0" smtClean="0"/>
-              <a:t>Each commit is verified </a:t>
-            </a:r>
-            <a:r>
               <a:rPr lang="en-US" dirty="0"/>
-              <a:t>by an automated </a:t>
-            </a:r>
-            <a:r>
-              <a:rPr lang="en-US" dirty="0" smtClean="0"/>
-              <a:t>build </a:t>
+              <a:t>Each commit is verified by an automated build </a:t>
             </a:r>
           </a:p>
           <a:p>
@@ -5883,16 +5842,8 @@
               <a:buChar char="Ø"/>
             </a:pPr>
             <a:r>
-              <a:rPr lang="en-US" dirty="0" smtClean="0"/>
-              <a:t>By </a:t>
-            </a:r>
-            <a:r>
               <a:rPr lang="en-US" dirty="0"/>
-              <a:t>integrating regularly, </a:t>
-            </a:r>
-            <a:r>
-              <a:rPr lang="en-US" dirty="0" smtClean="0"/>
-              <a:t>teams can </a:t>
+              <a:t>By integrating regularly, teams can </a:t>
             </a:r>
           </a:p>
           <a:p>
@@ -5901,16 +5852,8 @@
               <a:buChar char="Ø"/>
             </a:pPr>
             <a:r>
-              <a:rPr lang="en-US" dirty="0" smtClean="0"/>
-              <a:t>detect </a:t>
-            </a:r>
-            <a:r>
               <a:rPr lang="en-US" dirty="0"/>
-              <a:t>errors </a:t>
-            </a:r>
-            <a:r>
-              <a:rPr lang="en-US" dirty="0" smtClean="0"/>
-              <a:t>quickly </a:t>
+              <a:t>detect errors quickly </a:t>
             </a:r>
           </a:p>
           <a:p>
@@ -5919,16 +5862,8 @@
               <a:buChar char="Ø"/>
             </a:pPr>
             <a:r>
-              <a:rPr lang="en-US" dirty="0" smtClean="0"/>
-              <a:t>locate </a:t>
-            </a:r>
-            <a:r>
               <a:rPr lang="en-US" dirty="0"/>
-              <a:t>them more </a:t>
-            </a:r>
-            <a:r>
-              <a:rPr lang="en-US" dirty="0" smtClean="0"/>
-              <a:t>easily</a:t>
+              <a:t>locate them more easily</a:t>
             </a:r>
           </a:p>
           <a:p>
@@ -5937,10 +5872,9 @@
               <a:buChar char="Ø"/>
             </a:pPr>
             <a:r>
-              <a:rPr lang="en-US" dirty="0" smtClean="0"/>
+              <a:rPr lang="en-US" dirty="0"/>
               <a:t>ensure maximum code coverage for integration and regression tests</a:t>
             </a:r>
-            <a:endParaRPr lang="en-US" dirty="0"/>
           </a:p>
           <a:p>
             <a:pPr>
@@ -6370,10 +6304,9 @@
           <a:lstStyle/>
           <a:p>
             <a:r>
-              <a:rPr lang="en-US" dirty="0" smtClean="0"/>
+              <a:rPr lang="en-US" dirty="0"/>
               <a:t>CI Practices</a:t>
             </a:r>
-            <a:endParaRPr lang="en-US" dirty="0"/>
           </a:p>
         </p:txBody>
       </p:sp>
@@ -6397,12 +6330,8 @@
               <a:buChar char="Ø"/>
             </a:pPr>
             <a:r>
-              <a:rPr lang="en-US" dirty="0" smtClean="0"/>
-              <a:t>Maintain </a:t>
-            </a:r>
-            <a:r>
               <a:rPr lang="en-US" dirty="0"/>
-              <a:t>a single source repository</a:t>
+              <a:t>Maintain a single source repository</a:t>
             </a:r>
           </a:p>
           <a:p>
@@ -6411,12 +6340,8 @@
               <a:buChar char="Ø"/>
             </a:pPr>
             <a:r>
-              <a:rPr lang="en-US" dirty="0" smtClean="0"/>
-              <a:t>Automate </a:t>
-            </a:r>
-            <a:r>
               <a:rPr lang="en-US" dirty="0"/>
-              <a:t>the build</a:t>
+              <a:t>Automate the build</a:t>
             </a:r>
           </a:p>
           <a:p>
@@ -6425,12 +6350,8 @@
               <a:buChar char="Ø"/>
             </a:pPr>
             <a:r>
-              <a:rPr lang="en-US" dirty="0" smtClean="0"/>
-              <a:t>Make </a:t>
-            </a:r>
-            <a:r>
               <a:rPr lang="en-US" dirty="0"/>
-              <a:t>your build self-testing</a:t>
+              <a:t>Make your build self-testing</a:t>
             </a:r>
           </a:p>
           <a:p>
@@ -6439,12 +6360,8 @@
               <a:buChar char="Ø"/>
             </a:pPr>
             <a:r>
-              <a:rPr lang="en-US" dirty="0" smtClean="0"/>
-              <a:t>Every </a:t>
-            </a:r>
-            <a:r>
               <a:rPr lang="en-US" dirty="0"/>
-              <a:t>commit should build on an integration machine</a:t>
+              <a:t>Every commit should build on an integration machine</a:t>
             </a:r>
           </a:p>
           <a:p>
@@ -6453,12 +6370,8 @@
               <a:buChar char="Ø"/>
             </a:pPr>
             <a:r>
-              <a:rPr lang="en-US" dirty="0" smtClean="0"/>
-              <a:t>Keep </a:t>
-            </a:r>
-            <a:r>
               <a:rPr lang="en-US" dirty="0"/>
-              <a:t>the build fast</a:t>
+              <a:t>Keep the build fast</a:t>
             </a:r>
           </a:p>
           <a:p>
@@ -6467,12 +6380,8 @@
               <a:buChar char="Ø"/>
             </a:pPr>
             <a:r>
-              <a:rPr lang="en-US" dirty="0" smtClean="0"/>
-              <a:t>Test </a:t>
-            </a:r>
-            <a:r>
               <a:rPr lang="en-US" dirty="0"/>
-              <a:t>in a clone of the production environment</a:t>
+              <a:t>Test in a clone of the production environment</a:t>
             </a:r>
           </a:p>
           <a:p>
@@ -6481,12 +6390,8 @@
               <a:buChar char="Ø"/>
             </a:pPr>
             <a:r>
-              <a:rPr lang="en-US" dirty="0" smtClean="0"/>
-              <a:t>Make </a:t>
-            </a:r>
-            <a:r>
               <a:rPr lang="en-US" dirty="0"/>
-              <a:t>it easy for anyone to get the latest executable</a:t>
+              <a:t>Make it easy for anyone to get the latest executable</a:t>
             </a:r>
           </a:p>
           <a:p>
@@ -6495,12 +6400,8 @@
               <a:buChar char="Ø"/>
             </a:pPr>
             <a:r>
-              <a:rPr lang="en-US" dirty="0" smtClean="0"/>
-              <a:t>Everyone </a:t>
-            </a:r>
-            <a:r>
               <a:rPr lang="en-US" dirty="0"/>
-              <a:t>can see what’s happening</a:t>
+              <a:t>Everyone can see what’s happening</a:t>
             </a:r>
           </a:p>
           <a:p>
@@ -6509,12 +6410,8 @@
               <a:buChar char="Ø"/>
             </a:pPr>
             <a:r>
-              <a:rPr lang="en-US" dirty="0" smtClean="0"/>
-              <a:t>Automate </a:t>
-            </a:r>
-            <a:r>
               <a:rPr lang="en-US" dirty="0"/>
-              <a:t>deployment</a:t>
+              <a:t>Automate deployment</a:t>
             </a:r>
           </a:p>
           <a:p>
@@ -7039,18 +6936,9 @@
           <a:lstStyle/>
           <a:p>
             <a:r>
-              <a:rPr lang="en-US" dirty="0" smtClean="0"/>
-              <a:t>H</a:t>
-            </a:r>
-            <a:r>
               <a:rPr lang="en-US" dirty="0"/>
-              <a:t>ow to Implement CI </a:t>
-            </a:r>
-            <a:r>
-              <a:rPr lang="en-US" dirty="0" smtClean="0"/>
-              <a:t>Practices</a:t>
-            </a:r>
-            <a:endParaRPr lang="en-US" dirty="0"/>
+              <a:t>How to Implement CI Practices</a:t>
+            </a:r>
           </a:p>
         </p:txBody>
       </p:sp>
@@ -7076,12 +6964,8 @@
               <a:buChar char="Ø"/>
             </a:pPr>
             <a:r>
-              <a:rPr lang="en-US" dirty="0" smtClean="0"/>
-              <a:t>Developers </a:t>
-            </a:r>
-            <a:r>
               <a:rPr lang="en-US" dirty="0"/>
-              <a:t>check out code into their private workspaces.</a:t>
+              <a:t>Developers check out code into their private workspaces.</a:t>
             </a:r>
           </a:p>
           <a:p>
@@ -7090,12 +6974,8 @@
               <a:buChar char="Ø"/>
             </a:pPr>
             <a:r>
-              <a:rPr lang="en-US" dirty="0" smtClean="0"/>
-              <a:t>When </a:t>
-            </a:r>
-            <a:r>
               <a:rPr lang="en-US" dirty="0"/>
-              <a:t>done, the commit changes to the repository.</a:t>
+              <a:t>When done, the commit changes to the repository.</a:t>
             </a:r>
           </a:p>
           <a:p>
@@ -7104,12 +6984,8 @@
               <a:buChar char="Ø"/>
             </a:pPr>
             <a:r>
-              <a:rPr lang="en-US" dirty="0" smtClean="0"/>
-              <a:t>The </a:t>
-            </a:r>
-            <a:r>
               <a:rPr lang="en-US" dirty="0"/>
-              <a:t>CI server monitors the repository and checks out changes when they occur.</a:t>
+              <a:t>The CI server monitors the repository and checks out changes when they occur.</a:t>
             </a:r>
           </a:p>
           <a:p>
@@ -7118,12 +6994,8 @@
               <a:buChar char="Ø"/>
             </a:pPr>
             <a:r>
-              <a:rPr lang="en-US" dirty="0" smtClean="0"/>
-              <a:t>The </a:t>
-            </a:r>
-            <a:r>
               <a:rPr lang="en-US" dirty="0"/>
-              <a:t>CI server builds the system and runs unit and integration tests.</a:t>
+              <a:t>The CI server builds the system and runs unit and integration tests.</a:t>
             </a:r>
           </a:p>
           <a:p>
@@ -7132,20 +7004,8 @@
               <a:buChar char="Ø"/>
             </a:pPr>
             <a:r>
-              <a:rPr lang="en-US" dirty="0" smtClean="0"/>
-              <a:t>The </a:t>
-            </a:r>
-            <a:r>
               <a:rPr lang="en-US" dirty="0"/>
-              <a:t>CI server releases deployable </a:t>
-            </a:r>
-            <a:r>
-              <a:rPr lang="en-US" dirty="0" smtClean="0"/>
-              <a:t>artifacts </a:t>
-            </a:r>
-            <a:r>
-              <a:rPr lang="en-US" dirty="0"/>
-              <a:t>for testing.</a:t>
+              <a:t>The CI server releases deployable artifacts for testing.</a:t>
             </a:r>
           </a:p>
           <a:p>
@@ -7154,12 +7014,8 @@
               <a:buChar char="Ø"/>
             </a:pPr>
             <a:r>
-              <a:rPr lang="en-US" dirty="0" smtClean="0"/>
-              <a:t>The </a:t>
-            </a:r>
-            <a:r>
               <a:rPr lang="en-US" dirty="0"/>
-              <a:t>CI server assigns a build label to the version of the code it just built.</a:t>
+              <a:t>The CI server assigns a build label to the version of the code it just built.</a:t>
             </a:r>
           </a:p>
           <a:p>
@@ -7168,12 +7024,8 @@
               <a:buChar char="Ø"/>
             </a:pPr>
             <a:r>
-              <a:rPr lang="en-US" dirty="0" smtClean="0"/>
-              <a:t>The </a:t>
-            </a:r>
-            <a:r>
               <a:rPr lang="en-US" dirty="0"/>
-              <a:t>CI server informs the team of the successful build.</a:t>
+              <a:t>The CI server informs the team of the successful build.</a:t>
             </a:r>
           </a:p>
           <a:p>
@@ -7182,12 +7034,8 @@
               <a:buChar char="Ø"/>
             </a:pPr>
             <a:r>
-              <a:rPr lang="en-US" dirty="0" smtClean="0"/>
-              <a:t>If </a:t>
-            </a:r>
-            <a:r>
               <a:rPr lang="en-US" dirty="0"/>
-              <a:t>the build or tests fail, the CI server alerts the team.</a:t>
+              <a:t>If the build or tests fail, the CI server alerts the team.</a:t>
             </a:r>
           </a:p>
           <a:p>
@@ -7196,12 +7044,8 @@
               <a:buChar char="Ø"/>
             </a:pPr>
             <a:r>
-              <a:rPr lang="en-US" dirty="0" smtClean="0"/>
-              <a:t>The </a:t>
-            </a:r>
-            <a:r>
               <a:rPr lang="en-US" dirty="0"/>
-              <a:t>team fix the issue at the earliest opportunity.</a:t>
+              <a:t>The team fix the issue at the earliest opportunity.</a:t>
             </a:r>
           </a:p>
           <a:p>
@@ -7210,18 +7054,9 @@
               <a:buChar char="Ø"/>
             </a:pPr>
             <a:r>
-              <a:rPr lang="en-US" dirty="0" smtClean="0"/>
-              <a:t>Continue </a:t>
-            </a:r>
-            <a:r>
               <a:rPr lang="en-US" dirty="0"/>
-              <a:t>to continually integrate and test throughout the project</a:t>
-            </a:r>
-            <a:r>
-              <a:rPr lang="en-US" dirty="0" smtClean="0"/>
-              <a:t>.</a:t>
-            </a:r>
-            <a:endParaRPr lang="en-US" dirty="0"/>
+              <a:t>Continue to continually integrate and test throughout the project.</a:t>
+            </a:r>
           </a:p>
         </p:txBody>
       </p:sp>
@@ -7791,10 +7626,9 @@
           <a:lstStyle/>
           <a:p>
             <a:r>
-              <a:rPr lang="en-US" dirty="0" smtClean="0"/>
+              <a:rPr lang="en-US" dirty="0"/>
               <a:t>Team Responsibilities</a:t>
             </a:r>
-            <a:endParaRPr lang="en-US" dirty="0"/>
           </a:p>
         </p:txBody>
       </p:sp>
@@ -8221,10 +8055,9 @@
           <a:lstStyle/>
           <a:p>
             <a:r>
-              <a:rPr lang="en-US" dirty="0" smtClean="0"/>
+              <a:rPr lang="en-US" dirty="0"/>
               <a:t> </a:t>
             </a:r>
-            <a:endParaRPr lang="en-US" dirty="0"/>
           </a:p>
         </p:txBody>
       </p:sp>
@@ -8268,13 +8101,6 @@
   <p:clrMapOvr>
     <a:masterClrMapping/>
   </p:clrMapOvr>
-  <p:timing>
-    <p:tnLst>
-      <p:par>
-        <p:cTn id="1" dur="indefinite" restart="never" nodeType="tmRoot"/>
-      </p:par>
-    </p:tnLst>
-  </p:timing>
 </p:sld>
 </file>
 
@@ -8311,10 +8137,9 @@
           <a:lstStyle/>
           <a:p>
             <a:r>
-              <a:rPr lang="en-US" dirty="0" smtClean="0"/>
+              <a:rPr lang="en-US" dirty="0"/>
               <a:t>Hudson</a:t>
             </a:r>
-            <a:endParaRPr lang="en-US" dirty="0"/>
           </a:p>
         </p:txBody>
       </p:sp>
@@ -8340,16 +8165,8 @@
               <a:buChar char="Ø"/>
             </a:pPr>
             <a:r>
-              <a:rPr lang="en-US" dirty="0" smtClean="0"/>
-              <a:t>Hudson is </a:t>
-            </a:r>
-            <a:r>
               <a:rPr lang="en-US" dirty="0"/>
-              <a:t>a continuous integration and continuous delivery </a:t>
-            </a:r>
-            <a:r>
-              <a:rPr lang="en-US" dirty="0" smtClean="0"/>
-              <a:t>application</a:t>
+              <a:t>Hudson is a continuous integration and continuous delivery application</a:t>
             </a:r>
           </a:p>
           <a:p>
@@ -8358,10 +8175,9 @@
               <a:buChar char="Ø"/>
             </a:pPr>
             <a:r>
-              <a:rPr lang="en-US" dirty="0" smtClean="0"/>
+              <a:rPr lang="en-US" dirty="0"/>
               <a:t>Developed by Sun Microsystems in 2004</a:t>
             </a:r>
-            <a:endParaRPr lang="en-US" dirty="0"/>
           </a:p>
           <a:p>
             <a:pPr>
@@ -9044,10 +8860,9 @@
           <a:lstStyle/>
           <a:p>
             <a:r>
-              <a:rPr lang="en-US" dirty="0" smtClean="0"/>
+              <a:rPr lang="en-US" dirty="0"/>
               <a:t>Jenkins</a:t>
             </a:r>
-            <a:endParaRPr lang="en-US" dirty="0"/>
           </a:p>
         </p:txBody>
       </p:sp>
@@ -9072,15 +8887,7 @@
             </a:pPr>
             <a:r>
               <a:rPr lang="en-US" dirty="0"/>
-              <a:t>In </a:t>
-            </a:r>
-            <a:r>
-              <a:rPr lang="en-US" dirty="0" smtClean="0"/>
-              <a:t>2010, </a:t>
-            </a:r>
-            <a:r>
-              <a:rPr lang="en-US" dirty="0"/>
-              <a:t>project contributors and Oracle disputed control of Hudson</a:t>
+              <a:t>In 2010, project contributors and Oracle disputed control of Hudson</a:t>
             </a:r>
           </a:p>
           <a:p>
@@ -9089,7 +8896,7 @@
               <a:buChar char="Ø"/>
             </a:pPr>
             <a:r>
-              <a:rPr lang="en-US" dirty="0" smtClean="0"/>
+              <a:rPr lang="en-US" dirty="0"/>
               <a:t>In 2011, Jenkins forked away from Hudson</a:t>
             </a:r>
           </a:p>
@@ -9099,24 +8906,8 @@
               <a:buChar char="Ø"/>
             </a:pPr>
             <a:r>
-              <a:rPr lang="en-US" dirty="0" smtClean="0"/>
-              <a:t>Jenkins </a:t>
-            </a:r>
-            <a:r>
               <a:rPr lang="en-US" dirty="0"/>
-              <a:t>is </a:t>
-            </a:r>
-            <a:r>
-              <a:rPr lang="en-US" dirty="0" smtClean="0"/>
-              <a:t>also a continuous </a:t>
-            </a:r>
-            <a:r>
-              <a:rPr lang="en-US" dirty="0"/>
-              <a:t>integration and continuous delivery </a:t>
-            </a:r>
-            <a:r>
-              <a:rPr lang="en-US" dirty="0" smtClean="0"/>
-              <a:t>application</a:t>
+              <a:t>Jenkins is also a continuous integration and continuous delivery application</a:t>
             </a:r>
           </a:p>
           <a:p>
@@ -9125,7 +8916,7 @@
               <a:buChar char="Ø"/>
             </a:pPr>
             <a:r>
-              <a:rPr lang="en-US" dirty="0" smtClean="0"/>
+              <a:rPr lang="en-US" dirty="0"/>
               <a:t>Shares the same code base and functionality as Hudson</a:t>
             </a:r>
           </a:p>
@@ -9135,7 +8926,7 @@
               <a:buChar char="Ø"/>
             </a:pPr>
             <a:r>
-              <a:rPr lang="en-US" dirty="0" smtClean="0"/>
+              <a:rPr lang="en-US" dirty="0"/>
               <a:t>Jenkins has many more contributors</a:t>
             </a:r>
           </a:p>
@@ -9145,7 +8936,7 @@
               <a:buChar char="Ø"/>
             </a:pPr>
             <a:r>
-              <a:rPr lang="en-US" dirty="0" smtClean="0"/>
+              <a:rPr lang="en-US" dirty="0"/>
               <a:t>Releases new functionality faster than Hudson</a:t>
             </a:r>
           </a:p>
@@ -9155,15 +8946,15 @@
               <a:buChar char="Ø"/>
             </a:pPr>
             <a:r>
-              <a:rPr lang="en-US" dirty="0" smtClean="0"/>
+              <a:rPr lang="en-US" dirty="0"/>
               <a:t>Used by: Dell, LinkedIn, Facebook, eBay, </a:t>
             </a:r>
             <a:r>
-              <a:rPr lang="en-US" dirty="0" err="1" smtClean="0"/>
+              <a:rPr lang="en-US" dirty="0" err="1"/>
               <a:t>Github</a:t>
             </a:r>
             <a:r>
-              <a:rPr lang="en-US" dirty="0" smtClean="0"/>
+              <a:rPr lang="en-US" dirty="0"/>
               <a:t>, Netflix, NASA, Sony</a:t>
             </a:r>
           </a:p>

</xml_diff>